<commit_message>
Rename CONTRIBUTING.md to SUPPORT.md
</commit_message>
<xml_diff>
--- a/material/control.pptx
+++ b/material/control.pptx
@@ -243,7 +243,7 @@
           <a:p>
             <a:fld id="{3535F1E0-3918-4FD9-BF3E-5005B4AD4A66}" type="datetimeFigureOut">
               <a:rPr lang="en-GB" smtClean="0"/>
-              <a:t>23/07/2017</a:t>
+              <a:t>24/07/2017</a:t>
             </a:fld>
             <a:endParaRPr lang="en-GB"/>
           </a:p>
@@ -409,7 +409,7 @@
             <a:fld id="{E433751C-2A1E-49FF-98B8-4E34323593E0}" type="datetimeFigureOut">
               <a:rPr lang="en-US" smtClean="0"/>
               <a:pPr/>
-              <a:t>23-Jul-17</a:t>
+              <a:t>24-Jul-17</a:t>
             </a:fld>
             <a:endParaRPr lang="en-US"/>
           </a:p>
@@ -3979,8 +3979,8 @@
           </a:p>
         </p:txBody>
       </p:sp>
-      <mc:AlternateContent xmlns:mc="http://schemas.openxmlformats.org/markup-compatibility/2006">
-        <mc:Choice xmlns:a14="http://schemas.microsoft.com/office/drawing/2010/main" Requires="a14">
+      <mc:AlternateContent xmlns:mc="http://schemas.openxmlformats.org/markup-compatibility/2006" xmlns:a14="http://schemas.microsoft.com/office/drawing/2010/main">
+        <mc:Choice Requires="a14">
           <p:sp>
             <p:nvSpPr>
               <p:cNvPr id="4" name="TextBox 3"/>
@@ -4016,11 +4016,7 @@
                 </a:r>
                 <a:r>
                   <a:rPr lang="en-US" b="1" dirty="0" smtClean="0"/>
-                  <a:t>most </a:t>
-                </a:r>
-                <a:r>
-                  <a:rPr lang="en-US" b="1" dirty="0" smtClean="0"/>
-                  <a:t>of the job</a:t>
+                  <a:t>most of the job</a:t>
                 </a:r>
               </a:p>
               <a:p>
@@ -4107,7 +4103,7 @@
             </p:txBody>
           </p:sp>
         </mc:Choice>
-        <mc:Fallback>
+        <mc:Fallback xmlns="">
           <p:sp>
             <p:nvSpPr>
               <p:cNvPr id="4" name="TextBox 3"/>
@@ -8520,8 +8516,8 @@
           </p:sp>
         </mc:Fallback>
       </mc:AlternateContent>
-      <mc:AlternateContent xmlns:mc="http://schemas.openxmlformats.org/markup-compatibility/2006" xmlns:a14="http://schemas.microsoft.com/office/drawing/2010/main">
-        <mc:Choice Requires="a14">
+      <mc:AlternateContent xmlns:mc="http://schemas.openxmlformats.org/markup-compatibility/2006">
+        <mc:Choice xmlns:a14="http://schemas.microsoft.com/office/drawing/2010/main" Requires="a14">
           <p:sp>
             <p:nvSpPr>
               <p:cNvPr id="6" name="TextBox 5"/>
@@ -8531,7 +8527,7 @@
             <p:spPr>
               <a:xfrm>
                 <a:off x="5059213" y="3795179"/>
-                <a:ext cx="4934299" cy="1008546"/>
+                <a:ext cx="5347168" cy="1050031"/>
               </a:xfrm>
               <a:prstGeom prst="rect">
                 <a:avLst/>
@@ -8674,6 +8670,18 @@
                         </m:naryPr>
                         <m:sub>
                           <m:r>
+                            <a:rPr lang="en-US" sz="2400" b="0" i="1" smtClean="0">
+                              <a:latin typeface="Cambria Math" panose="02040503050406030204" pitchFamily="18" charset="0"/>
+                            </a:rPr>
+                            <m:t>𝑗</m:t>
+                          </m:r>
+                          <m:r>
+                            <a:rPr lang="en-US" sz="2400" b="0" i="1" smtClean="0">
+                              <a:latin typeface="Cambria Math" panose="02040503050406030204" pitchFamily="18" charset="0"/>
+                            </a:rPr>
+                            <m:t>=</m:t>
+                          </m:r>
+                          <m:r>
                             <m:rPr>
                               <m:brk m:alnAt="23"/>
                             </m:rPr>
@@ -8717,6 +8725,20 @@
                               </m:r>
                             </m:sub>
                           </m:sSub>
+                          <m:r>
+                            <a:rPr lang="en-US" sz="2400" i="1">
+                              <a:latin typeface="Cambria Math" panose="02040503050406030204" pitchFamily="18" charset="0"/>
+                              <a:ea typeface="Cambria Math" panose="02040503050406030204" pitchFamily="18" charset="0"/>
+                            </a:rPr>
+                            <m:t>∙</m:t>
+                          </m:r>
+                          <m:r>
+                            <a:rPr lang="en-US" sz="2400" b="0" i="1" smtClean="0">
+                              <a:latin typeface="Cambria Math" panose="02040503050406030204" pitchFamily="18" charset="0"/>
+                              <a:ea typeface="Cambria Math" panose="02040503050406030204" pitchFamily="18" charset="0"/>
+                            </a:rPr>
+                            <m:t>𝑇</m:t>
+                          </m:r>
                         </m:e>
                       </m:nary>
                       <m:r>
@@ -8839,7 +8861,7 @@
             </p:txBody>
           </p:sp>
         </mc:Choice>
-        <mc:Fallback xmlns="">
+        <mc:Fallback>
           <p:sp>
             <p:nvSpPr>
               <p:cNvPr id="6" name="TextBox 5"/>
@@ -8851,7 +8873,7 @@
             <p:spPr>
               <a:xfrm>
                 <a:off x="5059213" y="3795179"/>
-                <a:ext cx="4934299" cy="1008546"/>
+                <a:ext cx="5347168" cy="1050031"/>
               </a:xfrm>
               <a:prstGeom prst="rect">
                 <a:avLst/>

</xml_diff>